<commit_message>
PPT w BigML and H2O
</commit_message>
<xml_diff>
--- a/Presentation/Machine Learning As A Service.pptx
+++ b/Presentation/Machine Learning As A Service.pptx
@@ -5,7 +5,7 @@
     <p:sldMasterId id="2147484107" r:id="rId1"/>
   </p:sldMasterIdLst>
   <p:notesMasterIdLst>
-    <p:notesMasterId r:id="rId16"/>
+    <p:notesMasterId r:id="rId19"/>
   </p:notesMasterIdLst>
   <p:sldIdLst>
     <p:sldId id="257" r:id="rId2"/>
@@ -22,6 +22,9 @@
     <p:sldId id="310" r:id="rId13"/>
     <p:sldId id="315" r:id="rId14"/>
     <p:sldId id="318" r:id="rId15"/>
+    <p:sldId id="321" r:id="rId16"/>
+    <p:sldId id="320" r:id="rId17"/>
+    <p:sldId id="322" r:id="rId18"/>
   </p:sldIdLst>
   <p:sldSz cx="9144000" cy="6858000" type="screen4x3"/>
   <p:notesSz cx="6858000" cy="9144000"/>
@@ -251,7 +254,7 @@
               <a:pPr>
                 <a:defRPr/>
               </a:pPr>
-              <a:t>11/29/2018</a:t>
+              <a:t>12/1/2018</a:t>
             </a:fld>
             <a:endParaRPr lang="en-US"/>
           </a:p>
@@ -1098,7 +1101,7 @@
               <a:pPr>
                 <a:defRPr/>
               </a:pPr>
-              <a:t>11/29/2018</a:t>
+              <a:t>12/1/2018</a:t>
             </a:fld>
             <a:endParaRPr lang="en-US" altLang="en-US"/>
           </a:p>
@@ -1311,7 +1314,7 @@
               <a:pPr>
                 <a:defRPr/>
               </a:pPr>
-              <a:t>11/29/2018</a:t>
+              <a:t>12/1/2018</a:t>
             </a:fld>
             <a:endParaRPr lang="en-US" altLang="en-US"/>
           </a:p>
@@ -1534,7 +1537,7 @@
               <a:pPr>
                 <a:defRPr/>
               </a:pPr>
-              <a:t>11/29/2018</a:t>
+              <a:t>12/1/2018</a:t>
             </a:fld>
             <a:endParaRPr lang="en-US" altLang="en-US"/>
           </a:p>
@@ -2032,7 +2035,7 @@
               <a:pPr>
                 <a:defRPr/>
               </a:pPr>
-              <a:t>11/29/2018</a:t>
+              <a:t>12/1/2018</a:t>
             </a:fld>
             <a:endParaRPr lang="en-US" altLang="en-US"/>
           </a:p>
@@ -2256,7 +2259,7 @@
               <a:pPr>
                 <a:defRPr/>
               </a:pPr>
-              <a:t>11/29/2018</a:t>
+              <a:t>12/1/2018</a:t>
             </a:fld>
             <a:endParaRPr lang="en-US" altLang="en-US"/>
           </a:p>
@@ -2597,7 +2600,7 @@
               <a:pPr>
                 <a:defRPr/>
               </a:pPr>
-              <a:t>11/29/2018</a:t>
+              <a:t>12/1/2018</a:t>
             </a:fld>
             <a:endParaRPr lang="en-US" altLang="en-US"/>
           </a:p>
@@ -2968,7 +2971,7 @@
               <a:pPr>
                 <a:defRPr/>
               </a:pPr>
-              <a:t>11/29/2018</a:t>
+              <a:t>12/1/2018</a:t>
             </a:fld>
             <a:endParaRPr lang="en-US" altLang="en-US"/>
           </a:p>
@@ -3258,7 +3261,7 @@
               <a:pPr>
                 <a:defRPr/>
               </a:pPr>
-              <a:t>11/29/2018</a:t>
+              <a:t>12/1/2018</a:t>
             </a:fld>
             <a:endParaRPr lang="en-US" altLang="en-US"/>
           </a:p>
@@ -3538,7 +3541,7 @@
               <a:pPr>
                 <a:defRPr/>
               </a:pPr>
-              <a:t>11/29/2018</a:t>
+              <a:t>12/1/2018</a:t>
             </a:fld>
             <a:endParaRPr lang="en-US" altLang="en-US"/>
           </a:p>
@@ -3965,7 +3968,7 @@
               <a:pPr>
                 <a:defRPr/>
               </a:pPr>
-              <a:t>11/29/2018</a:t>
+              <a:t>12/1/2018</a:t>
             </a:fld>
             <a:endParaRPr lang="en-US" altLang="en-US"/>
           </a:p>
@@ -4121,7 +4124,7 @@
               <a:pPr>
                 <a:defRPr/>
               </a:pPr>
-              <a:t>11/29/2018</a:t>
+              <a:t>12/1/2018</a:t>
             </a:fld>
             <a:endParaRPr lang="en-US" altLang="en-US"/>
           </a:p>
@@ -4249,7 +4252,7 @@
               <a:pPr>
                 <a:defRPr/>
               </a:pPr>
-              <a:t>11/29/2018</a:t>
+              <a:t>12/1/2018</a:t>
             </a:fld>
             <a:endParaRPr lang="en-US" altLang="en-US"/>
           </a:p>
@@ -4575,7 +4578,7 @@
               <a:pPr>
                 <a:defRPr/>
               </a:pPr>
-              <a:t>11/29/2018</a:t>
+              <a:t>12/1/2018</a:t>
             </a:fld>
             <a:endParaRPr lang="en-US" altLang="en-US"/>
           </a:p>
@@ -4878,7 +4881,7 @@
               <a:pPr>
                 <a:defRPr/>
               </a:pPr>
-              <a:t>11/29/2018</a:t>
+              <a:t>12/1/2018</a:t>
             </a:fld>
             <a:endParaRPr lang="en-US" altLang="en-US"/>
           </a:p>
@@ -5134,7 +5137,7 @@
               <a:pPr>
                 <a:defRPr/>
               </a:pPr>
-              <a:t>11/29/2018</a:t>
+              <a:t>12/1/2018</a:t>
             </a:fld>
             <a:endParaRPr lang="en-US" altLang="en-US"/>
           </a:p>
@@ -6480,7 +6483,7 @@
         </p:nvSpPr>
         <p:spPr>
           <a:xfrm>
-            <a:off x="409575" y="762000"/>
+            <a:off x="404813" y="632701"/>
             <a:ext cx="7886700" cy="993775"/>
           </a:xfrm>
         </p:spPr>
@@ -6490,11 +6493,18 @@
           <a:p>
             <a:pPr algn="l"/>
             <a:r>
+              <a:rPr lang="en-US" altLang="en-US" sz="3200" dirty="0" err="1">
+                <a:latin typeface="Helvetica" panose="020B0604020202020204" pitchFamily="34" charset="0"/>
+                <a:ea typeface="ＭＳ Ｐゴシック" panose="020B0600070205080204" pitchFamily="34" charset="-128"/>
+              </a:rPr>
+              <a:t>AutoML</a:t>
+            </a:r>
+            <a:r>
               <a:rPr lang="en-US" altLang="en-US" sz="3200" dirty="0">
                 <a:latin typeface="Helvetica" panose="020B0604020202020204" pitchFamily="34" charset="0"/>
                 <a:ea typeface="ＭＳ Ｐゴシック" panose="020B0600070205080204" pitchFamily="34" charset="-128"/>
               </a:rPr>
-              <a:t>H2O AI Description</a:t>
+              <a:t> Services</a:t>
             </a:r>
           </a:p>
         </p:txBody>
@@ -6517,32 +6527,116 @@
         </p:nvSpPr>
         <p:spPr>
           <a:xfrm>
-            <a:off x="404813" y="1447800"/>
-            <a:ext cx="8510587" cy="5257800"/>
+            <a:off x="404813" y="1600200"/>
+            <a:ext cx="8510587" cy="5105400"/>
           </a:xfrm>
         </p:spPr>
         <p:txBody>
-          <a:bodyPr/>
+          <a:bodyPr>
+            <a:normAutofit/>
+          </a:bodyPr>
           <a:lstStyle/>
           <a:p>
+            <a:pPr fontAlgn="base"/>
+            <a:r>
+              <a:rPr lang="en-US" sz="2000" dirty="0" err="1">
+                <a:latin typeface="Helvetica" panose="020B0604020202020204" pitchFamily="34" charset="0"/>
+                <a:cs typeface="Helvetica" panose="020B0604020202020204" pitchFamily="34" charset="0"/>
+              </a:rPr>
+              <a:t>AutoML</a:t>
+            </a:r>
+            <a:r>
+              <a:rPr lang="en-US" sz="2000" dirty="0">
+                <a:latin typeface="Helvetica" panose="020B0604020202020204" pitchFamily="34" charset="0"/>
+                <a:cs typeface="Helvetica" panose="020B0604020202020204" pitchFamily="34" charset="0"/>
+              </a:rPr>
+              <a:t> provides methods and processes to make Machine Learning available for non-Machine Learning experts, to improve efficiency of Machine Learning and to accelerate research on Machine Learning</a:t>
+            </a:r>
+          </a:p>
+          <a:p>
             <a:pPr marL="0" indent="0">
               <a:buNone/>
-              <a:defRPr/>
-            </a:pPr>
-            <a:endParaRPr lang="en-US" altLang="en-US" sz="2400" dirty="0">
+            </a:pPr>
+            <a:endParaRPr lang="en-US" sz="2000" dirty="0">
               <a:latin typeface="Helvetica" panose="020B0604020202020204" pitchFamily="34" charset="0"/>
-              <a:ea typeface="ＭＳ Ｐゴシック" panose="020B0600070205080204" pitchFamily="34" charset="-128"/>
+              <a:cs typeface="Helvetica" panose="020B0604020202020204" pitchFamily="34" charset="0"/>
             </a:endParaRPr>
           </a:p>
           <a:p>
-            <a:pPr marL="0" indent="0">
-              <a:buNone/>
-              <a:defRPr/>
-            </a:pPr>
-            <a:endParaRPr lang="en-US" altLang="en-US" sz="2400" dirty="0">
-              <a:latin typeface="Helvetica" panose="020B0604020202020204" pitchFamily="34" charset="0"/>
-              <a:ea typeface="ＭＳ Ｐゴシック" panose="020B0600070205080204" pitchFamily="34" charset="-128"/>
-            </a:endParaRPr>
+            <a:r>
+              <a:rPr lang="en-US" sz="2000" dirty="0" err="1">
+                <a:latin typeface="Helvetica" panose="020B0604020202020204" pitchFamily="34" charset="0"/>
+                <a:cs typeface="Helvetica" panose="020B0604020202020204" pitchFamily="34" charset="0"/>
+              </a:rPr>
+              <a:t>AutoML</a:t>
+            </a:r>
+            <a:r>
+              <a:rPr lang="en-US" sz="2000" dirty="0">
+                <a:latin typeface="Helvetica" panose="020B0604020202020204" pitchFamily="34" charset="0"/>
+                <a:cs typeface="Helvetica" panose="020B0604020202020204" pitchFamily="34" charset="0"/>
+              </a:rPr>
+              <a:t> helps us in automating tasks whose complexity can often baffle non-ML experts, like :</a:t>
+            </a:r>
+          </a:p>
+          <a:p>
+            <a:pPr lvl="1" fontAlgn="base"/>
+            <a:r>
+              <a:rPr lang="en-US" sz="2000" dirty="0">
+                <a:latin typeface="Helvetica" panose="020B0604020202020204" pitchFamily="34" charset="0"/>
+                <a:cs typeface="Helvetica" panose="020B0604020202020204" pitchFamily="34" charset="0"/>
+              </a:rPr>
+              <a:t>Preprocess and clean the data.</a:t>
+            </a:r>
+          </a:p>
+          <a:p>
+            <a:pPr lvl="1" fontAlgn="base"/>
+            <a:r>
+              <a:rPr lang="en-US" sz="2000" dirty="0">
+                <a:latin typeface="Helvetica" panose="020B0604020202020204" pitchFamily="34" charset="0"/>
+                <a:cs typeface="Helvetica" panose="020B0604020202020204" pitchFamily="34" charset="0"/>
+              </a:rPr>
+              <a:t>Select and construct appropriate features.</a:t>
+            </a:r>
+          </a:p>
+          <a:p>
+            <a:pPr lvl="1" fontAlgn="base"/>
+            <a:r>
+              <a:rPr lang="en-US" sz="2000" dirty="0">
+                <a:latin typeface="Helvetica" panose="020B0604020202020204" pitchFamily="34" charset="0"/>
+                <a:cs typeface="Helvetica" panose="020B0604020202020204" pitchFamily="34" charset="0"/>
+              </a:rPr>
+              <a:t>Select an appropriate model family.</a:t>
+            </a:r>
+          </a:p>
+          <a:p>
+            <a:pPr lvl="1" fontAlgn="base"/>
+            <a:r>
+              <a:rPr lang="en-US" sz="2000" dirty="0">
+                <a:latin typeface="Helvetica" panose="020B0604020202020204" pitchFamily="34" charset="0"/>
+                <a:cs typeface="Helvetica" panose="020B0604020202020204" pitchFamily="34" charset="0"/>
+              </a:rPr>
+              <a:t>Optimize model hyperparameters.</a:t>
+            </a:r>
+          </a:p>
+          <a:p>
+            <a:pPr lvl="1" fontAlgn="base"/>
+            <a:r>
+              <a:rPr lang="en-US" sz="2000" dirty="0">
+                <a:latin typeface="Helvetica" panose="020B0604020202020204" pitchFamily="34" charset="0"/>
+                <a:cs typeface="Helvetica" panose="020B0604020202020204" pitchFamily="34" charset="0"/>
+              </a:rPr>
+              <a:t>Postprocess machine learning models.</a:t>
+            </a:r>
+          </a:p>
+          <a:p>
+            <a:pPr lvl="1" fontAlgn="base"/>
+            <a:r>
+              <a:rPr lang="en-US" sz="2000" dirty="0">
+                <a:latin typeface="Helvetica" panose="020B0604020202020204" pitchFamily="34" charset="0"/>
+                <a:cs typeface="Helvetica" panose="020B0604020202020204" pitchFamily="34" charset="0"/>
+              </a:rPr>
+              <a:t>Critically analyze the results obtained.</a:t>
+            </a:r>
           </a:p>
         </p:txBody>
       </p:sp>
@@ -6631,19 +6725,58 @@
         </p:nvSpPr>
         <p:spPr>
           <a:xfrm>
-            <a:off x="404813" y="1447800"/>
-            <a:ext cx="8510587" cy="5257800"/>
+            <a:off x="404813" y="1600200"/>
+            <a:ext cx="8510587" cy="5105399"/>
           </a:xfrm>
         </p:spPr>
         <p:txBody>
-          <a:bodyPr/>
+          <a:bodyPr>
+            <a:normAutofit/>
+          </a:bodyPr>
           <a:lstStyle/>
           <a:p>
             <a:pPr marL="0" indent="0">
               <a:buNone/>
               <a:defRPr/>
             </a:pPr>
-            <a:endParaRPr lang="en-US" altLang="en-US" sz="2400" dirty="0">
+            <a:r>
+              <a:rPr lang="en-US" altLang="en-US" sz="2000" dirty="0">
+                <a:latin typeface="Helvetica" panose="020B0604020202020204" pitchFamily="34" charset="0"/>
+                <a:ea typeface="ＭＳ Ｐゴシック" panose="020B0600070205080204" pitchFamily="34" charset="-128"/>
+              </a:rPr>
+              <a:t>Overview :</a:t>
+            </a:r>
+          </a:p>
+          <a:p>
+            <a:pPr>
+              <a:defRPr/>
+            </a:pPr>
+            <a:r>
+              <a:rPr lang="en-US" altLang="en-US" sz="2000" dirty="0">
+                <a:latin typeface="Helvetica" panose="020B0604020202020204" pitchFamily="34" charset="0"/>
+                <a:ea typeface="ＭＳ Ｐゴシック" panose="020B0600070205080204" pitchFamily="34" charset="-128"/>
+              </a:rPr>
+              <a:t>H2O is an open-source software for big-data analysis.</a:t>
+            </a:r>
+          </a:p>
+          <a:p>
+            <a:pPr>
+              <a:defRPr/>
+            </a:pPr>
+            <a:r>
+              <a:rPr lang="en-US" altLang="en-US" sz="2000" dirty="0">
+                <a:latin typeface="Helvetica" panose="020B0604020202020204" pitchFamily="34" charset="0"/>
+                <a:ea typeface="ＭＳ Ｐゴシック" panose="020B0600070205080204" pitchFamily="34" charset="-128"/>
+              </a:rPr>
+              <a:t>H2O allows users to fit thousands of potential models as part of discovering patterns in data.</a:t>
+            </a:r>
+          </a:p>
+          <a:p>
+            <a:pPr marL="0" indent="0">
+              <a:buNone/>
+              <a:defRPr/>
+            </a:pPr>
+            <a:endParaRPr lang="en-US" altLang="en-US" sz="2000" dirty="0">
               <a:latin typeface="Helvetica" panose="020B0604020202020204" pitchFamily="34" charset="0"/>
               <a:ea typeface="ＭＳ Ｐゴシック" panose="020B0600070205080204" pitchFamily="34" charset="-128"/>
             </a:endParaRPr>
@@ -6654,37 +6787,61 @@
               <a:defRPr/>
             </a:pPr>
             <a:r>
-              <a:rPr lang="en-US" altLang="en-US" sz="2400" dirty="0">
+              <a:rPr lang="en-US" altLang="en-US" sz="2000" dirty="0">
                 <a:latin typeface="Helvetica" panose="020B0604020202020204" pitchFamily="34" charset="0"/>
                 <a:ea typeface="ＭＳ Ｐゴシック" panose="020B0600070205080204" pitchFamily="34" charset="-128"/>
               </a:rPr>
-              <a:t>Pros:</a:t>
-            </a:r>
-          </a:p>
-          <a:p>
-            <a:pPr marL="0" indent="0">
-              <a:buNone/>
-              <a:defRPr/>
-            </a:pPr>
-            <a:r>
-              <a:rPr lang="en-US" altLang="en-US" sz="2400" dirty="0">
+              <a:t>Salient Features :</a:t>
+            </a:r>
+          </a:p>
+          <a:p>
+            <a:pPr>
+              <a:defRPr/>
+            </a:pPr>
+            <a:r>
+              <a:rPr lang="en-US" altLang="en-US" sz="2000" dirty="0">
                 <a:latin typeface="Helvetica" panose="020B0604020202020204" pitchFamily="34" charset="0"/>
                 <a:ea typeface="ＭＳ Ｐゴシック" panose="020B0600070205080204" pitchFamily="34" charset="-128"/>
               </a:rPr>
-              <a:t>Model Selection </a:t>
-            </a:r>
-          </a:p>
-          <a:p>
-            <a:pPr marL="0" indent="0">
-              <a:buNone/>
-              <a:defRPr/>
-            </a:pPr>
-            <a:r>
-              <a:rPr lang="en-US" altLang="en-US" sz="2400" dirty="0">
+              <a:t>It automates the model selection and validation process in the Machine Learning pipeline through its </a:t>
+            </a:r>
+            <a:r>
+              <a:rPr lang="en-US" altLang="en-US" sz="2000" dirty="0" err="1">
                 <a:latin typeface="Helvetica" panose="020B0604020202020204" pitchFamily="34" charset="0"/>
                 <a:ea typeface="ＭＳ Ｐゴシック" panose="020B0600070205080204" pitchFamily="34" charset="-128"/>
               </a:rPr>
-              <a:t>Model Validation</a:t>
+              <a:t>AutoML</a:t>
+            </a:r>
+            <a:r>
+              <a:rPr lang="en-US" altLang="en-US" sz="2000" dirty="0">
+                <a:latin typeface="Helvetica" panose="020B0604020202020204" pitchFamily="34" charset="0"/>
+                <a:ea typeface="ＭＳ Ｐゴシック" panose="020B0600070205080204" pitchFamily="34" charset="-128"/>
+              </a:rPr>
+              <a:t> framework.</a:t>
+            </a:r>
+          </a:p>
+          <a:p>
+            <a:pPr>
+              <a:defRPr/>
+            </a:pPr>
+            <a:r>
+              <a:rPr lang="en-US" altLang="en-US" sz="2000" dirty="0">
+                <a:latin typeface="Helvetica" panose="020B0604020202020204" pitchFamily="34" charset="0"/>
+                <a:ea typeface="ＭＳ Ｐゴシック" panose="020B0600070205080204" pitchFamily="34" charset="-128"/>
+              </a:rPr>
+              <a:t>H2O is built on top of the Hadoop distributed framework, thereby enabling faster data processing on its clusters.</a:t>
+            </a:r>
+          </a:p>
+          <a:p>
+            <a:pPr>
+              <a:defRPr/>
+            </a:pPr>
+            <a:r>
+              <a:rPr lang="en-US" altLang="en-US" sz="2000" dirty="0">
+                <a:latin typeface="Helvetica" panose="020B0604020202020204" pitchFamily="34" charset="0"/>
+                <a:ea typeface="ＭＳ Ｐゴシック" panose="020B0600070205080204" pitchFamily="34" charset="-128"/>
+              </a:rPr>
+              <a:t>It also has functions for exporting the trained models as JAVA POJO’s for productionizing the model once it has been validated.</a:t>
             </a:r>
           </a:p>
         </p:txBody>
@@ -6693,6 +6850,571 @@
     <p:extLst>
       <p:ext uri="{BB962C8B-B14F-4D97-AF65-F5344CB8AC3E}">
         <p14:creationId xmlns:p14="http://schemas.microsoft.com/office/powerpoint/2010/main" val="722202203"/>
+      </p:ext>
+    </p:extLst>
+  </p:cSld>
+  <p:clrMapOvr>
+    <a:masterClrMapping/>
+  </p:clrMapOvr>
+</p:sld>
+</file>
+
+<file path=ppt/slides/slide15.xml><?xml version="1.0" encoding="utf-8"?>
+<p:sld xmlns:a="http://schemas.openxmlformats.org/drawingml/2006/main" xmlns:r="http://schemas.openxmlformats.org/officeDocument/2006/relationships" xmlns:p="http://schemas.openxmlformats.org/presentationml/2006/main">
+  <p:cSld>
+    <p:spTree>
+      <p:nvGrpSpPr>
+        <p:cNvPr id="1" name=""/>
+        <p:cNvGrpSpPr/>
+        <p:nvPr/>
+      </p:nvGrpSpPr>
+      <p:grpSpPr>
+        <a:xfrm>
+          <a:off x="0" y="0"/>
+          <a:ext cx="0" cy="0"/>
+          <a:chOff x="0" y="0"/>
+          <a:chExt cx="0" cy="0"/>
+        </a:xfrm>
+      </p:grpSpPr>
+      <p:sp>
+        <p:nvSpPr>
+          <p:cNvPr id="2" name="Title 1">
+            <a:extLst>
+              <a:ext uri="{FF2B5EF4-FFF2-40B4-BE49-F238E27FC236}">
+                <a16:creationId xmlns:a16="http://schemas.microsoft.com/office/drawing/2014/main" id="{18ED84CE-90D4-408D-8966-E7A914E0C0D0}"/>
+              </a:ext>
+            </a:extLst>
+          </p:cNvPr>
+          <p:cNvSpPr>
+            <a:spLocks noGrp="1"/>
+          </p:cNvSpPr>
+          <p:nvPr>
+            <p:ph type="title"/>
+          </p:nvPr>
+        </p:nvSpPr>
+        <p:spPr>
+          <a:xfrm>
+            <a:off x="628650" y="609600"/>
+            <a:ext cx="7886700" cy="1081089"/>
+          </a:xfrm>
+        </p:spPr>
+        <p:txBody>
+          <a:bodyPr>
+            <a:normAutofit/>
+          </a:bodyPr>
+          <a:lstStyle/>
+          <a:p>
+            <a:r>
+              <a:rPr lang="en-US" sz="3200" dirty="0">
+                <a:latin typeface="Helvetica" panose="020B0604020202020204" pitchFamily="34" charset="0"/>
+                <a:cs typeface="Helvetica" panose="020B0604020202020204" pitchFamily="34" charset="0"/>
+              </a:rPr>
+              <a:t>H2O AI DEMO</a:t>
+            </a:r>
+          </a:p>
+        </p:txBody>
+      </p:sp>
+      <p:sp>
+        <p:nvSpPr>
+          <p:cNvPr id="3" name="Content Placeholder 2">
+            <a:extLst>
+              <a:ext uri="{FF2B5EF4-FFF2-40B4-BE49-F238E27FC236}">
+                <a16:creationId xmlns:a16="http://schemas.microsoft.com/office/drawing/2014/main" id="{DDE22BBA-0D10-48EC-A24C-33E7C1A5557E}"/>
+              </a:ext>
+            </a:extLst>
+          </p:cNvPr>
+          <p:cNvSpPr>
+            <a:spLocks noGrp="1"/>
+          </p:cNvSpPr>
+          <p:nvPr>
+            <p:ph idx="1"/>
+          </p:nvPr>
+        </p:nvSpPr>
+        <p:spPr/>
+        <p:txBody>
+          <a:bodyPr>
+            <a:normAutofit/>
+          </a:bodyPr>
+          <a:lstStyle/>
+          <a:p>
+            <a:r>
+              <a:rPr lang="en-US" sz="2200" dirty="0">
+                <a:latin typeface="Helvetica" panose="020B0604020202020204" pitchFamily="34" charset="0"/>
+                <a:cs typeface="Helvetica" panose="020B0604020202020204" pitchFamily="34" charset="0"/>
+              </a:rPr>
+              <a:t>Regression on Iowa Housing Price Data Set</a:t>
+            </a:r>
+          </a:p>
+          <a:p>
+            <a:pPr marL="0" indent="0">
+              <a:buNone/>
+            </a:pPr>
+            <a:r>
+              <a:rPr lang="en-US" sz="2200" dirty="0">
+                <a:latin typeface="Helvetica" panose="020B0604020202020204" pitchFamily="34" charset="0"/>
+                <a:cs typeface="Helvetica" panose="020B0604020202020204" pitchFamily="34" charset="0"/>
+              </a:rPr>
+              <a:t>To predict the </a:t>
+            </a:r>
+            <a:r>
+              <a:rPr lang="en-US" sz="2200" dirty="0" err="1">
+                <a:latin typeface="Helvetica" panose="020B0604020202020204" pitchFamily="34" charset="0"/>
+                <a:cs typeface="Helvetica" panose="020B0604020202020204" pitchFamily="34" charset="0"/>
+              </a:rPr>
+              <a:t>SalePrice</a:t>
+            </a:r>
+            <a:r>
+              <a:rPr lang="en-US" sz="2200" dirty="0">
+                <a:latin typeface="Helvetica" panose="020B0604020202020204" pitchFamily="34" charset="0"/>
+                <a:cs typeface="Helvetica" panose="020B0604020202020204" pitchFamily="34" charset="0"/>
+              </a:rPr>
+              <a:t> of the house</a:t>
+            </a:r>
+          </a:p>
+          <a:p>
+            <a:pPr marL="0" indent="0">
+              <a:buNone/>
+            </a:pPr>
+            <a:endParaRPr lang="en-US" sz="2200" dirty="0">
+              <a:latin typeface="Helvetica" panose="020B0604020202020204" pitchFamily="34" charset="0"/>
+              <a:cs typeface="Helvetica" panose="020B0604020202020204" pitchFamily="34" charset="0"/>
+            </a:endParaRPr>
+          </a:p>
+          <a:p>
+            <a:pPr marL="0" indent="0">
+              <a:buNone/>
+            </a:pPr>
+            <a:endParaRPr lang="en-US" sz="2200" dirty="0">
+              <a:latin typeface="Helvetica" panose="020B0604020202020204" pitchFamily="34" charset="0"/>
+              <a:cs typeface="Helvetica" panose="020B0604020202020204" pitchFamily="34" charset="0"/>
+            </a:endParaRPr>
+          </a:p>
+          <a:p>
+            <a:r>
+              <a:rPr lang="en-US" sz="2200" dirty="0">
+                <a:latin typeface="Helvetica" panose="020B0604020202020204" pitchFamily="34" charset="0"/>
+                <a:cs typeface="Helvetica" panose="020B0604020202020204" pitchFamily="34" charset="0"/>
+              </a:rPr>
+              <a:t>Classification on Titanic Data Set</a:t>
+            </a:r>
+          </a:p>
+          <a:p>
+            <a:pPr marL="0" indent="0">
+              <a:buNone/>
+            </a:pPr>
+            <a:r>
+              <a:rPr lang="en-US" sz="2200" dirty="0">
+                <a:latin typeface="Helvetica" panose="020B0604020202020204" pitchFamily="34" charset="0"/>
+                <a:cs typeface="Helvetica" panose="020B0604020202020204" pitchFamily="34" charset="0"/>
+              </a:rPr>
+              <a:t>To predict the chance of Survival</a:t>
+            </a:r>
+          </a:p>
+        </p:txBody>
+      </p:sp>
+    </p:spTree>
+    <p:extLst>
+      <p:ext uri="{BB962C8B-B14F-4D97-AF65-F5344CB8AC3E}">
+        <p14:creationId xmlns:p14="http://schemas.microsoft.com/office/powerpoint/2010/main" val="2267316831"/>
+      </p:ext>
+    </p:extLst>
+  </p:cSld>
+  <p:clrMapOvr>
+    <a:masterClrMapping/>
+  </p:clrMapOvr>
+</p:sld>
+</file>
+
+<file path=ppt/slides/slide16.xml><?xml version="1.0" encoding="utf-8"?>
+<p:sld xmlns:a="http://schemas.openxmlformats.org/drawingml/2006/main" xmlns:r="http://schemas.openxmlformats.org/officeDocument/2006/relationships" xmlns:p="http://schemas.openxmlformats.org/presentationml/2006/main">
+  <p:cSld>
+    <p:spTree>
+      <p:nvGrpSpPr>
+        <p:cNvPr id="1" name=""/>
+        <p:cNvGrpSpPr/>
+        <p:nvPr/>
+      </p:nvGrpSpPr>
+      <p:grpSpPr>
+        <a:xfrm>
+          <a:off x="0" y="0"/>
+          <a:ext cx="0" cy="0"/>
+          <a:chOff x="0" y="0"/>
+          <a:chExt cx="0" cy="0"/>
+        </a:xfrm>
+      </p:grpSpPr>
+      <p:sp>
+        <p:nvSpPr>
+          <p:cNvPr id="2" name="Title 1">
+            <a:extLst>
+              <a:ext uri="{FF2B5EF4-FFF2-40B4-BE49-F238E27FC236}">
+                <a16:creationId xmlns:a16="http://schemas.microsoft.com/office/drawing/2014/main" id="{EED7D955-4529-4137-9DC2-D3F1F96FC4D5}"/>
+              </a:ext>
+            </a:extLst>
+          </p:cNvPr>
+          <p:cNvSpPr>
+            <a:spLocks noGrp="1"/>
+          </p:cNvSpPr>
+          <p:nvPr>
+            <p:ph type="title"/>
+          </p:nvPr>
+        </p:nvSpPr>
+        <p:spPr>
+          <a:xfrm>
+            <a:off x="628650" y="666751"/>
+            <a:ext cx="7886700" cy="1158874"/>
+          </a:xfrm>
+        </p:spPr>
+        <p:txBody>
+          <a:bodyPr/>
+          <a:lstStyle/>
+          <a:p>
+            <a:r>
+              <a:rPr lang="en-US" dirty="0" err="1">
+                <a:latin typeface="Helvetica" panose="020B0604020202020204" pitchFamily="34" charset="0"/>
+                <a:cs typeface="Helvetica" panose="020B0604020202020204" pitchFamily="34" charset="0"/>
+              </a:rPr>
+              <a:t>BigML</a:t>
+            </a:r>
+            <a:endParaRPr lang="en-US" dirty="0">
+              <a:latin typeface="Helvetica" panose="020B0604020202020204" pitchFamily="34" charset="0"/>
+              <a:cs typeface="Helvetica" panose="020B0604020202020204" pitchFamily="34" charset="0"/>
+            </a:endParaRPr>
+          </a:p>
+        </p:txBody>
+      </p:sp>
+      <p:sp>
+        <p:nvSpPr>
+          <p:cNvPr id="3" name="Content Placeholder 2">
+            <a:extLst>
+              <a:ext uri="{FF2B5EF4-FFF2-40B4-BE49-F238E27FC236}">
+                <a16:creationId xmlns:a16="http://schemas.microsoft.com/office/drawing/2014/main" id="{BDB34310-8676-4522-B1B4-1CF7E2B6EE62}"/>
+              </a:ext>
+            </a:extLst>
+          </p:cNvPr>
+          <p:cNvSpPr>
+            <a:spLocks noGrp="1"/>
+          </p:cNvSpPr>
+          <p:nvPr>
+            <p:ph idx="1"/>
+          </p:nvPr>
+        </p:nvSpPr>
+        <p:spPr/>
+        <p:txBody>
+          <a:bodyPr/>
+          <a:lstStyle/>
+          <a:p>
+            <a:pPr marL="0" indent="0">
+              <a:buNone/>
+            </a:pPr>
+            <a:r>
+              <a:rPr lang="en-US" dirty="0">
+                <a:latin typeface="Helvetica" panose="020B0604020202020204" pitchFamily="34" charset="0"/>
+                <a:cs typeface="Helvetica" panose="020B0604020202020204" pitchFamily="34" charset="0"/>
+              </a:rPr>
+              <a:t>Overview :</a:t>
+            </a:r>
+          </a:p>
+          <a:p>
+            <a:r>
+              <a:rPr lang="en-US" dirty="0" err="1">
+                <a:latin typeface="Helvetica" panose="020B0604020202020204" pitchFamily="34" charset="0"/>
+                <a:cs typeface="Helvetica" panose="020B0604020202020204" pitchFamily="34" charset="0"/>
+              </a:rPr>
+              <a:t>BigML</a:t>
+            </a:r>
+            <a:r>
+              <a:rPr lang="en-US" dirty="0">
+                <a:latin typeface="Helvetica" panose="020B0604020202020204" pitchFamily="34" charset="0"/>
+                <a:cs typeface="Helvetica" panose="020B0604020202020204" pitchFamily="34" charset="0"/>
+              </a:rPr>
+              <a:t> is </a:t>
+            </a:r>
+            <a:r>
+              <a:rPr lang="en-US" dirty="0" err="1">
+                <a:latin typeface="Helvetica" panose="020B0604020202020204" pitchFamily="34" charset="0"/>
+                <a:cs typeface="Helvetica" panose="020B0604020202020204" pitchFamily="34" charset="0"/>
+              </a:rPr>
+              <a:t>MLaaS</a:t>
+            </a:r>
+            <a:r>
+              <a:rPr lang="en-US" dirty="0">
+                <a:latin typeface="Helvetica" panose="020B0604020202020204" pitchFamily="34" charset="0"/>
+                <a:cs typeface="Helvetica" panose="020B0604020202020204" pitchFamily="34" charset="0"/>
+              </a:rPr>
+              <a:t>, which provides robustly-engineered Machine Learning algorithms proven to solve real world problems, through a simple and elegant web interface.</a:t>
+            </a:r>
+          </a:p>
+          <a:p>
+            <a:pPr marL="0" indent="0">
+              <a:buNone/>
+            </a:pPr>
+            <a:endParaRPr lang="en-US" dirty="0">
+              <a:latin typeface="Helvetica" panose="020B0604020202020204" pitchFamily="34" charset="0"/>
+              <a:cs typeface="Helvetica" panose="020B0604020202020204" pitchFamily="34" charset="0"/>
+            </a:endParaRPr>
+          </a:p>
+          <a:p>
+            <a:pPr marL="0" indent="0">
+              <a:buNone/>
+            </a:pPr>
+            <a:r>
+              <a:rPr lang="en-US" dirty="0">
+                <a:latin typeface="Helvetica" panose="020B0604020202020204" pitchFamily="34" charset="0"/>
+                <a:cs typeface="Helvetica" panose="020B0604020202020204" pitchFamily="34" charset="0"/>
+              </a:rPr>
+              <a:t>Features :</a:t>
+            </a:r>
+          </a:p>
+          <a:p>
+            <a:r>
+              <a:rPr lang="en-US" dirty="0">
+                <a:latin typeface="Helvetica" panose="020B0604020202020204" pitchFamily="34" charset="0"/>
+                <a:cs typeface="Helvetica" panose="020B0604020202020204" pitchFamily="34" charset="0"/>
+              </a:rPr>
+              <a:t>Like H2o it provides an </a:t>
+            </a:r>
+            <a:r>
+              <a:rPr lang="en-US" dirty="0" err="1">
+                <a:latin typeface="Helvetica" panose="020B0604020202020204" pitchFamily="34" charset="0"/>
+                <a:cs typeface="Helvetica" panose="020B0604020202020204" pitchFamily="34" charset="0"/>
+              </a:rPr>
+              <a:t>OptiML</a:t>
+            </a:r>
+            <a:r>
+              <a:rPr lang="en-US" dirty="0">
+                <a:latin typeface="Helvetica" panose="020B0604020202020204" pitchFamily="34" charset="0"/>
+                <a:cs typeface="Helvetica" panose="020B0604020202020204" pitchFamily="34" charset="0"/>
+              </a:rPr>
+              <a:t> library for </a:t>
+            </a:r>
+            <a:r>
+              <a:rPr lang="en-US" dirty="0" err="1">
+                <a:latin typeface="Helvetica" panose="020B0604020202020204" pitchFamily="34" charset="0"/>
+                <a:cs typeface="Helvetica" panose="020B0604020202020204" pitchFamily="34" charset="0"/>
+              </a:rPr>
+              <a:t>AutoML</a:t>
+            </a:r>
+            <a:r>
+              <a:rPr lang="en-US" dirty="0">
+                <a:latin typeface="Helvetica" panose="020B0604020202020204" pitchFamily="34" charset="0"/>
+                <a:cs typeface="Helvetica" panose="020B0604020202020204" pitchFamily="34" charset="0"/>
+              </a:rPr>
+              <a:t> </a:t>
+            </a:r>
+            <a:r>
+              <a:rPr lang="en-US" dirty="0" err="1">
+                <a:latin typeface="Helvetica" panose="020B0604020202020204" pitchFamily="34" charset="0"/>
+                <a:cs typeface="Helvetica" panose="020B0604020202020204" pitchFamily="34" charset="0"/>
+              </a:rPr>
+              <a:t>pupose</a:t>
+            </a:r>
+            <a:r>
+              <a:rPr lang="en-US" dirty="0">
+                <a:latin typeface="Helvetica" panose="020B0604020202020204" pitchFamily="34" charset="0"/>
+                <a:cs typeface="Helvetica" panose="020B0604020202020204" pitchFamily="34" charset="0"/>
+              </a:rPr>
+              <a:t>.</a:t>
+            </a:r>
+          </a:p>
+          <a:p>
+            <a:r>
+              <a:rPr lang="en-US" dirty="0">
+                <a:latin typeface="Helvetica" panose="020B0604020202020204" pitchFamily="34" charset="0"/>
+                <a:cs typeface="Helvetica" panose="020B0604020202020204" pitchFamily="34" charset="0"/>
+              </a:rPr>
+              <a:t>It is platform independent i.e. it can access data from AWS, Google Drive, etc.</a:t>
+            </a:r>
+          </a:p>
+          <a:p>
+            <a:r>
+              <a:rPr lang="en-US" dirty="0">
+                <a:latin typeface="Helvetica" panose="020B0604020202020204" pitchFamily="34" charset="0"/>
+                <a:cs typeface="Helvetica" panose="020B0604020202020204" pitchFamily="34" charset="0"/>
+              </a:rPr>
+              <a:t>The Web UI is extremely intuitive and easy to use.</a:t>
+            </a:r>
+          </a:p>
+          <a:p>
+            <a:r>
+              <a:rPr lang="en-US" dirty="0">
+                <a:latin typeface="Helvetica" panose="020B0604020202020204" pitchFamily="34" charset="0"/>
+                <a:cs typeface="Helvetica" panose="020B0604020202020204" pitchFamily="34" charset="0"/>
+              </a:rPr>
+              <a:t>The models are very interpretable</a:t>
+            </a:r>
+          </a:p>
+        </p:txBody>
+      </p:sp>
+    </p:spTree>
+    <p:extLst>
+      <p:ext uri="{BB962C8B-B14F-4D97-AF65-F5344CB8AC3E}">
+        <p14:creationId xmlns:p14="http://schemas.microsoft.com/office/powerpoint/2010/main" val="1747880691"/>
+      </p:ext>
+    </p:extLst>
+  </p:cSld>
+  <p:clrMapOvr>
+    <a:masterClrMapping/>
+  </p:clrMapOvr>
+</p:sld>
+</file>
+
+<file path=ppt/slides/slide17.xml><?xml version="1.0" encoding="utf-8"?>
+<p:sld xmlns:a="http://schemas.openxmlformats.org/drawingml/2006/main" xmlns:r="http://schemas.openxmlformats.org/officeDocument/2006/relationships" xmlns:p="http://schemas.openxmlformats.org/presentationml/2006/main">
+  <p:cSld>
+    <p:spTree>
+      <p:nvGrpSpPr>
+        <p:cNvPr id="1" name=""/>
+        <p:cNvGrpSpPr/>
+        <p:nvPr/>
+      </p:nvGrpSpPr>
+      <p:grpSpPr>
+        <a:xfrm>
+          <a:off x="0" y="0"/>
+          <a:ext cx="0" cy="0"/>
+          <a:chOff x="0" y="0"/>
+          <a:chExt cx="0" cy="0"/>
+        </a:xfrm>
+      </p:grpSpPr>
+      <p:sp>
+        <p:nvSpPr>
+          <p:cNvPr id="2" name="Title 1">
+            <a:extLst>
+              <a:ext uri="{FF2B5EF4-FFF2-40B4-BE49-F238E27FC236}">
+                <a16:creationId xmlns:a16="http://schemas.microsoft.com/office/drawing/2014/main" id="{EF794C47-4DB9-4060-AF5B-C3F5DAF2CF16}"/>
+              </a:ext>
+            </a:extLst>
+          </p:cNvPr>
+          <p:cNvSpPr>
+            <a:spLocks noGrp="1"/>
+          </p:cNvSpPr>
+          <p:nvPr>
+            <p:ph type="title"/>
+          </p:nvPr>
+        </p:nvSpPr>
+        <p:spPr/>
+        <p:txBody>
+          <a:bodyPr>
+            <a:normAutofit/>
+          </a:bodyPr>
+          <a:lstStyle/>
+          <a:p>
+            <a:r>
+              <a:rPr lang="en-US" sz="3200" dirty="0" err="1">
+                <a:latin typeface="Helvetica" panose="020B0604020202020204" pitchFamily="34" charset="0"/>
+                <a:cs typeface="Helvetica" panose="020B0604020202020204" pitchFamily="34" charset="0"/>
+              </a:rPr>
+              <a:t>BigML</a:t>
+            </a:r>
+            <a:r>
+              <a:rPr lang="en-US" sz="3200" dirty="0">
+                <a:latin typeface="Helvetica" panose="020B0604020202020204" pitchFamily="34" charset="0"/>
+                <a:cs typeface="Helvetica" panose="020B0604020202020204" pitchFamily="34" charset="0"/>
+              </a:rPr>
+              <a:t> DEMO</a:t>
+            </a:r>
+          </a:p>
+        </p:txBody>
+      </p:sp>
+      <p:sp>
+        <p:nvSpPr>
+          <p:cNvPr id="3" name="Content Placeholder 2">
+            <a:extLst>
+              <a:ext uri="{FF2B5EF4-FFF2-40B4-BE49-F238E27FC236}">
+                <a16:creationId xmlns:a16="http://schemas.microsoft.com/office/drawing/2014/main" id="{D179188A-1792-4E9E-B41E-6361998473D4}"/>
+              </a:ext>
+            </a:extLst>
+          </p:cNvPr>
+          <p:cNvSpPr>
+            <a:spLocks noGrp="1"/>
+          </p:cNvSpPr>
+          <p:nvPr>
+            <p:ph idx="1"/>
+          </p:nvPr>
+        </p:nvSpPr>
+        <p:spPr/>
+        <p:txBody>
+          <a:bodyPr/>
+          <a:lstStyle/>
+          <a:p>
+            <a:r>
+              <a:rPr lang="en-US" sz="2000" dirty="0">
+                <a:latin typeface="Helvetica" panose="020B0604020202020204" pitchFamily="34" charset="0"/>
+                <a:cs typeface="Helvetica" panose="020B0604020202020204" pitchFamily="34" charset="0"/>
+              </a:rPr>
+              <a:t>Regression on Iowa Housing Price Data Set</a:t>
+            </a:r>
+          </a:p>
+          <a:p>
+            <a:pPr marL="0" indent="0">
+              <a:buNone/>
+            </a:pPr>
+            <a:r>
+              <a:rPr lang="en-US" sz="2000" dirty="0">
+                <a:latin typeface="Helvetica" panose="020B0604020202020204" pitchFamily="34" charset="0"/>
+                <a:cs typeface="Helvetica" panose="020B0604020202020204" pitchFamily="34" charset="0"/>
+              </a:rPr>
+              <a:t>To predict the </a:t>
+            </a:r>
+            <a:r>
+              <a:rPr lang="en-US" sz="2000" dirty="0" err="1">
+                <a:latin typeface="Helvetica" panose="020B0604020202020204" pitchFamily="34" charset="0"/>
+                <a:cs typeface="Helvetica" panose="020B0604020202020204" pitchFamily="34" charset="0"/>
+              </a:rPr>
+              <a:t>SalePrice</a:t>
+            </a:r>
+            <a:r>
+              <a:rPr lang="en-US" sz="2000" dirty="0">
+                <a:latin typeface="Helvetica" panose="020B0604020202020204" pitchFamily="34" charset="0"/>
+                <a:cs typeface="Helvetica" panose="020B0604020202020204" pitchFamily="34" charset="0"/>
+              </a:rPr>
+              <a:t> of the house</a:t>
+            </a:r>
+          </a:p>
+          <a:p>
+            <a:pPr marL="0" indent="0">
+              <a:buNone/>
+            </a:pPr>
+            <a:endParaRPr lang="en-US" sz="2000" dirty="0">
+              <a:latin typeface="Helvetica" panose="020B0604020202020204" pitchFamily="34" charset="0"/>
+              <a:cs typeface="Helvetica" panose="020B0604020202020204" pitchFamily="34" charset="0"/>
+            </a:endParaRPr>
+          </a:p>
+          <a:p>
+            <a:pPr marL="0" indent="0">
+              <a:buNone/>
+            </a:pPr>
+            <a:endParaRPr lang="en-US" sz="2000" dirty="0">
+              <a:latin typeface="Helvetica" panose="020B0604020202020204" pitchFamily="34" charset="0"/>
+              <a:cs typeface="Helvetica" panose="020B0604020202020204" pitchFamily="34" charset="0"/>
+            </a:endParaRPr>
+          </a:p>
+          <a:p>
+            <a:r>
+              <a:rPr lang="en-US" sz="2000" dirty="0">
+                <a:latin typeface="Helvetica" panose="020B0604020202020204" pitchFamily="34" charset="0"/>
+                <a:cs typeface="Helvetica" panose="020B0604020202020204" pitchFamily="34" charset="0"/>
+              </a:rPr>
+              <a:t>Classification on Titanic Data Set</a:t>
+            </a:r>
+          </a:p>
+          <a:p>
+            <a:pPr marL="0" indent="0">
+              <a:buNone/>
+            </a:pPr>
+            <a:r>
+              <a:rPr lang="en-US" sz="2000" dirty="0">
+                <a:latin typeface="Helvetica" panose="020B0604020202020204" pitchFamily="34" charset="0"/>
+                <a:cs typeface="Helvetica" panose="020B0604020202020204" pitchFamily="34" charset="0"/>
+              </a:rPr>
+              <a:t>To predict the chance of Survival</a:t>
+            </a:r>
+          </a:p>
+        </p:txBody>
+      </p:sp>
+    </p:spTree>
+    <p:extLst>
+      <p:ext uri="{BB962C8B-B14F-4D97-AF65-F5344CB8AC3E}">
+        <p14:creationId xmlns:p14="http://schemas.microsoft.com/office/powerpoint/2010/main" val="1535310050"/>
       </p:ext>
     </p:extLst>
   </p:cSld>
@@ -6791,20 +7513,9 @@
               <a:rPr lang="en-US" altLang="en-US" sz="2200" dirty="0">
                 <a:latin typeface="Helvetica" panose="020B0604020202020204" pitchFamily="34" charset="0"/>
                 <a:ea typeface="ＭＳ Ｐゴシック" panose="020B0600070205080204" pitchFamily="34" charset="-128"/>
-                <a:hlinkClick r:id="rId2" action="ppaction://hlinksldjump">
-                  <a:extLst>
-                    <a:ext uri="{A12FA001-AC4F-418D-AE19-62706E023703}">
-                      <ahyp:hlinkClr xmlns:ahyp="http://schemas.microsoft.com/office/drawing/2018/hyperlinkcolor" val="tx"/>
-                    </a:ext>
-                  </a:extLst>
-                </a:hlinkClick>
               </a:rPr>
               <a:t>Machine Learning Pipeline </a:t>
             </a:r>
-            <a:endParaRPr lang="en-US" altLang="en-US" sz="2200" dirty="0">
-              <a:latin typeface="Helvetica" panose="020B0604020202020204" pitchFamily="34" charset="0"/>
-              <a:ea typeface="ＭＳ Ｐゴシック" panose="020B0600070205080204" pitchFamily="34" charset="-128"/>
-            </a:endParaRPr>
           </a:p>
           <a:p>
             <a:r>
@@ -6835,7 +7546,7 @@
                 <a:latin typeface="Helvetica" panose="020B0604020202020204" pitchFamily="34" charset="0"/>
                 <a:ea typeface="ＭＳ Ｐゴシック" panose="020B0600070205080204" pitchFamily="34" charset="-128"/>
               </a:rPr>
-              <a:t> make it easy?</a:t>
+              <a:t> makes it easy?</a:t>
             </a:r>
           </a:p>
           <a:p>
@@ -6855,7 +7566,7 @@
                 <a:hlinkClick r:id="" action="ppaction://noaction">
                   <a:extLst>
                     <a:ext uri="{A12FA001-AC4F-418D-AE19-62706E023703}">
-                      <ahyp:hlinkClr xmlns:ahyp="http://schemas.microsoft.com/office/drawing/2018/hyperlinkcolor" val="tx"/>
+                      <ahyp:hlinkClr xmlns="" xmlns:ahyp="http://schemas.microsoft.com/office/drawing/2018/hyperlinkcolor" val="tx"/>
                     </a:ext>
                   </a:extLst>
                 </a:hlinkClick>
@@ -6874,11 +7585,18 @@
           </a:p>
           <a:p>
             <a:r>
+              <a:rPr lang="en-US" altLang="en-US" sz="2200" u="sng" dirty="0" err="1">
+                <a:latin typeface="Helvetica" panose="020B0604020202020204" pitchFamily="34" charset="0"/>
+                <a:ea typeface="ＭＳ Ｐゴシック" panose="020B0600070205080204" pitchFamily="34" charset="-128"/>
+              </a:rPr>
+              <a:t>BigML</a:t>
+            </a:r>
+            <a:r>
               <a:rPr lang="en-US" altLang="en-US" sz="2200" u="sng" dirty="0">
                 <a:latin typeface="Helvetica" panose="020B0604020202020204" pitchFamily="34" charset="0"/>
                 <a:ea typeface="ＭＳ Ｐゴシック" panose="020B0600070205080204" pitchFamily="34" charset="-128"/>
               </a:rPr>
-              <a:t>H2O (</a:t>
+              <a:t> &amp; </a:t>
             </a:r>
             <a:r>
               <a:rPr lang="en-US" altLang="en-US" sz="2200" u="sng" dirty="0" err="1">
@@ -6887,13 +7605,10 @@
               </a:rPr>
               <a:t>AutoML</a:t>
             </a:r>
-            <a:r>
-              <a:rPr lang="en-US" altLang="en-US" sz="2200" u="sng" dirty="0">
-                <a:latin typeface="Helvetica" panose="020B0604020202020204" pitchFamily="34" charset="0"/>
-                <a:ea typeface="ＭＳ Ｐゴシック" panose="020B0600070205080204" pitchFamily="34" charset="-128"/>
-              </a:rPr>
-              <a:t>)</a:t>
-            </a:r>
+            <a:endParaRPr lang="en-US" altLang="en-US" sz="2200" u="sng" dirty="0">
+              <a:latin typeface="Helvetica" panose="020B0604020202020204" pitchFamily="34" charset="0"/>
+              <a:ea typeface="ＭＳ Ｐゴシック" panose="020B0600070205080204" pitchFamily="34" charset="-128"/>
+            </a:endParaRPr>
           </a:p>
         </p:txBody>
       </p:sp>
@@ -7353,58 +8068,52 @@
               <a:defRPr/>
             </a:pPr>
             <a:r>
-              <a:rPr lang="en-US" altLang="en-US" sz="2000" dirty="0">
+              <a:rPr lang="en-US" altLang="en-US" sz="2000" b="1" dirty="0" err="1">
                 <a:latin typeface="Helvetica" panose="020B0604020202020204" pitchFamily="34" charset="0"/>
                 <a:ea typeface="ＭＳ Ｐゴシック" panose="020B0600070205080204" pitchFamily="34" charset="-128"/>
               </a:rPr>
-              <a:t>Databricks</a:t>
-            </a:r>
-          </a:p>
-          <a:p>
-            <a:pPr>
-              <a:defRPr/>
-            </a:pPr>
-            <a:r>
-              <a:rPr lang="en-US" altLang="en-US" sz="2000" dirty="0">
-                <a:latin typeface="Helvetica" panose="020B0604020202020204" pitchFamily="34" charset="0"/>
-                <a:ea typeface="ＭＳ Ｐゴシック" panose="020B0600070205080204" pitchFamily="34" charset="-128"/>
-              </a:rPr>
-              <a:t>Google Prediction API</a:t>
-            </a:r>
-          </a:p>
-          <a:p>
-            <a:pPr>
-              <a:defRPr/>
-            </a:pPr>
-            <a:r>
-              <a:rPr lang="en-US" altLang="en-US" sz="2000" dirty="0">
-                <a:latin typeface="Helvetica" panose="020B0604020202020204" pitchFamily="34" charset="0"/>
-                <a:ea typeface="ＭＳ Ｐゴシック" panose="020B0600070205080204" pitchFamily="34" charset="-128"/>
-              </a:rPr>
-              <a:t>IBM Watson</a:t>
-            </a:r>
-          </a:p>
-          <a:p>
-            <a:pPr>
-              <a:defRPr/>
-            </a:pPr>
-            <a:r>
-              <a:rPr lang="en-US" altLang="en-US" sz="2000" dirty="0">
-                <a:latin typeface="Helvetica" panose="020B0604020202020204" pitchFamily="34" charset="0"/>
-                <a:ea typeface="ＭＳ Ｐゴシック" panose="020B0600070205080204" pitchFamily="34" charset="-128"/>
-              </a:rPr>
-              <a:t>TensorFlow</a:t>
-            </a:r>
-          </a:p>
-          <a:p>
-            <a:pPr marL="0" indent="0">
-              <a:buNone/>
-              <a:defRPr/>
-            </a:pPr>
-            <a:endParaRPr lang="en-US" altLang="en-US" sz="2000" dirty="0">
+              <a:t>BigML</a:t>
+            </a:r>
+            <a:endParaRPr lang="en-US" altLang="en-US" sz="2000" b="1" dirty="0">
               <a:latin typeface="Helvetica" panose="020B0604020202020204" pitchFamily="34" charset="0"/>
               <a:ea typeface="ＭＳ Ｐゴシック" panose="020B0600070205080204" pitchFamily="34" charset="-128"/>
             </a:endParaRPr>
+          </a:p>
+          <a:p>
+            <a:pPr>
+              <a:defRPr/>
+            </a:pPr>
+            <a:r>
+              <a:rPr lang="en-US" altLang="en-US" sz="2000" dirty="0">
+                <a:latin typeface="Helvetica" panose="020B0604020202020204" pitchFamily="34" charset="0"/>
+                <a:ea typeface="ＭＳ Ｐゴシック" panose="020B0600070205080204" pitchFamily="34" charset="-128"/>
+              </a:rPr>
+              <a:t>Databricks</a:t>
+            </a:r>
+          </a:p>
+          <a:p>
+            <a:pPr>
+              <a:defRPr/>
+            </a:pPr>
+            <a:r>
+              <a:rPr lang="en-US" altLang="en-US" sz="2000" dirty="0">
+                <a:latin typeface="Helvetica" panose="020B0604020202020204" pitchFamily="34" charset="0"/>
+                <a:ea typeface="ＭＳ Ｐゴシック" panose="020B0600070205080204" pitchFamily="34" charset="-128"/>
+              </a:rPr>
+              <a:t>Google Prediction API</a:t>
+            </a:r>
+          </a:p>
+          <a:p>
+            <a:pPr>
+              <a:defRPr/>
+            </a:pPr>
+            <a:r>
+              <a:rPr lang="en-US" altLang="en-US" sz="2000" dirty="0">
+                <a:latin typeface="Helvetica" panose="020B0604020202020204" pitchFamily="34" charset="0"/>
+                <a:ea typeface="ＭＳ Ｐゴシック" panose="020B0600070205080204" pitchFamily="34" charset="-128"/>
+              </a:rPr>
+              <a:t>IBM Watson</a:t>
+            </a:r>
           </a:p>
         </p:txBody>
       </p:sp>
@@ -7606,7 +8315,7 @@
           <a:graphicData uri="http://schemas.openxmlformats.org/presentationml/2006/ole">
             <mc:AlternateContent xmlns:mc="http://schemas.openxmlformats.org/markup-compatibility/2006">
               <mc:Choice xmlns:v="urn:schemas-microsoft-com:vml" Requires="v">
-                <p:oleObj spid="_x0000_s1034" name="Packager Shell Object" showAsIcon="1" r:id="rId4" imgW="3290760" imgH="488520" progId="Package">
+                <p:oleObj spid="_x0000_s1044" name="Packager Shell Object" showAsIcon="1" r:id="rId4" imgW="3290760" imgH="488520" progId="Package">
                   <p:embed/>
                 </p:oleObj>
               </mc:Choice>

</xml_diff>

<commit_message>
Part2 & Part3 added
</commit_message>
<xml_diff>
--- a/Presentation/Machine Learning As A Service.pptx
+++ b/Presentation/Machine Learning As A Service.pptx
@@ -5,7 +5,7 @@
     <p:sldMasterId id="2147484107" r:id="rId1"/>
   </p:sldMasterIdLst>
   <p:notesMasterIdLst>
-    <p:notesMasterId r:id="rId24"/>
+    <p:notesMasterId r:id="rId25"/>
   </p:notesMasterIdLst>
   <p:sldIdLst>
     <p:sldId id="257" r:id="rId2"/>
@@ -30,6 +30,7 @@
     <p:sldId id="321" r:id="rId21"/>
     <p:sldId id="320" r:id="rId22"/>
     <p:sldId id="322" r:id="rId23"/>
+    <p:sldId id="331" r:id="rId24"/>
   </p:sldIdLst>
   <p:sldSz cx="9144000" cy="6858000" type="screen4x3"/>
   <p:notesSz cx="6858000" cy="9144000"/>
@@ -9798,7 +9799,7 @@
                 <a:hlinkClick r:id="" action="ppaction://noaction">
                   <a:extLst>
                     <a:ext uri="{A12FA001-AC4F-418D-AE19-62706E023703}">
-                      <ahyp:hlinkClr xmlns:ahyp="http://schemas.microsoft.com/office/drawing/2018/hyperlinkcolor" val="tx"/>
+                      <ahyp:hlinkClr xmlns:ahyp="http://schemas.microsoft.com/office/drawing/2018/hyperlinkcolor" xmlns="" val="tx"/>
                     </a:ext>
                   </a:extLst>
                 </a:hlinkClick>
@@ -10900,37 +10901,7 @@
           </a:bodyPr>
           <a:lstStyle/>
           <a:p>
-            <a:r>
-              <a:rPr lang="en-US">
-                <a:solidFill>
-                  <a:srgbClr val="000000"/>
-                </a:solidFill>
-                <a:latin typeface="Helvetica" panose="020B0604020202020204" pitchFamily="34" charset="0"/>
-                <a:cs typeface="Helvetica" panose="020B0604020202020204" pitchFamily="34" charset="0"/>
-              </a:rPr>
-              <a:t>Regression on Iowa Housing Price Data Set</a:t>
-            </a:r>
-          </a:p>
-          <a:p>
-            <a:pPr marL="0" indent="0">
-              <a:buNone/>
-            </a:pPr>
-            <a:r>
-              <a:rPr lang="en-US">
-                <a:solidFill>
-                  <a:srgbClr val="000000"/>
-                </a:solidFill>
-                <a:latin typeface="Helvetica" panose="020B0604020202020204" pitchFamily="34" charset="0"/>
-                <a:cs typeface="Helvetica" panose="020B0604020202020204" pitchFamily="34" charset="0"/>
-              </a:rPr>
-              <a:t>To predict the SalePrice of the house</a:t>
-            </a:r>
-          </a:p>
-          <a:p>
-            <a:pPr marL="0" indent="0">
-              <a:buNone/>
-            </a:pPr>
-            <a:endParaRPr lang="en-US">
+            <a:endParaRPr lang="en-US" dirty="0">
               <a:solidFill>
                 <a:srgbClr val="000000"/>
               </a:solidFill>
@@ -10939,10 +10910,57 @@
             </a:endParaRPr>
           </a:p>
           <a:p>
+            <a:r>
+              <a:rPr lang="en-US" dirty="0">
+                <a:solidFill>
+                  <a:srgbClr val="000000"/>
+                </a:solidFill>
+                <a:latin typeface="Helvetica" panose="020B0604020202020204" pitchFamily="34" charset="0"/>
+                <a:cs typeface="Helvetica" panose="020B0604020202020204" pitchFamily="34" charset="0"/>
+              </a:rPr>
+              <a:t>Regression on Iowa Housing Price Data Set</a:t>
+            </a:r>
+          </a:p>
+          <a:p>
             <a:pPr marL="0" indent="0">
               <a:buNone/>
             </a:pPr>
-            <a:endParaRPr lang="en-US">
+            <a:r>
+              <a:rPr lang="en-US" dirty="0">
+                <a:solidFill>
+                  <a:srgbClr val="000000"/>
+                </a:solidFill>
+                <a:latin typeface="Helvetica" panose="020B0604020202020204" pitchFamily="34" charset="0"/>
+                <a:cs typeface="Helvetica" panose="020B0604020202020204" pitchFamily="34" charset="0"/>
+              </a:rPr>
+              <a:t>To predict the </a:t>
+            </a:r>
+            <a:r>
+              <a:rPr lang="en-US" dirty="0" err="1">
+                <a:solidFill>
+                  <a:srgbClr val="000000"/>
+                </a:solidFill>
+                <a:latin typeface="Helvetica" panose="020B0604020202020204" pitchFamily="34" charset="0"/>
+                <a:cs typeface="Helvetica" panose="020B0604020202020204" pitchFamily="34" charset="0"/>
+              </a:rPr>
+              <a:t>SalePrice</a:t>
+            </a:r>
+            <a:r>
+              <a:rPr lang="en-US" dirty="0">
+                <a:solidFill>
+                  <a:srgbClr val="000000"/>
+                </a:solidFill>
+                <a:latin typeface="Helvetica" panose="020B0604020202020204" pitchFamily="34" charset="0"/>
+                <a:cs typeface="Helvetica" panose="020B0604020202020204" pitchFamily="34" charset="0"/>
+              </a:rPr>
+              <a:t> of the house</a:t>
+            </a:r>
+          </a:p>
+          <a:p>
+            <a:pPr marL="0" indent="0">
+              <a:buNone/>
+            </a:pPr>
+            <a:endParaRPr lang="en-US" dirty="0">
               <a:solidFill>
                 <a:srgbClr val="000000"/>
               </a:solidFill>
@@ -10952,7 +10970,7 @@
           </a:p>
           <a:p>
             <a:r>
-              <a:rPr lang="en-US">
+              <a:rPr lang="en-US" dirty="0">
                 <a:solidFill>
                   <a:srgbClr val="000000"/>
                 </a:solidFill>
@@ -10967,7 +10985,7 @@
               <a:buNone/>
             </a:pPr>
             <a:r>
-              <a:rPr lang="en-US">
+              <a:rPr lang="en-US" dirty="0">
                 <a:solidFill>
                   <a:srgbClr val="000000"/>
                 </a:solidFill>
@@ -10983,6 +11001,409 @@
     <p:extLst>
       <p:ext uri="{BB962C8B-B14F-4D97-AF65-F5344CB8AC3E}">
         <p14:creationId xmlns:p14="http://schemas.microsoft.com/office/powerpoint/2010/main" val="1535310050"/>
+      </p:ext>
+    </p:extLst>
+  </p:cSld>
+  <p:clrMapOvr>
+    <a:masterClrMapping/>
+  </p:clrMapOvr>
+</p:sld>
+</file>
+
+<file path=ppt/slides/slide23.xml><?xml version="1.0" encoding="utf-8"?>
+<p:sld xmlns:a="http://schemas.openxmlformats.org/drawingml/2006/main" xmlns:r="http://schemas.openxmlformats.org/officeDocument/2006/relationships" xmlns:p="http://schemas.openxmlformats.org/presentationml/2006/main">
+  <p:cSld>
+    <p:bg>
+      <p:bgPr>
+        <a:solidFill>
+          <a:schemeClr val="bg1"/>
+        </a:solidFill>
+        <a:effectLst/>
+      </p:bgPr>
+    </p:bg>
+    <p:spTree>
+      <p:nvGrpSpPr>
+        <p:cNvPr id="1" name=""/>
+        <p:cNvGrpSpPr/>
+        <p:nvPr/>
+      </p:nvGrpSpPr>
+      <p:grpSpPr>
+        <a:xfrm>
+          <a:off x="0" y="0"/>
+          <a:ext cx="0" cy="0"/>
+          <a:chOff x="0" y="0"/>
+          <a:chExt cx="0" cy="0"/>
+        </a:xfrm>
+      </p:grpSpPr>
+      <p:sp useBgFill="1">
+        <p:nvSpPr>
+          <p:cNvPr id="8" name="Rectangle 7">
+            <a:extLst>
+              <a:ext uri="{FF2B5EF4-FFF2-40B4-BE49-F238E27FC236}">
+                <a16:creationId xmlns:a16="http://schemas.microsoft.com/office/drawing/2014/main" id="{3B854194-185D-494D-905C-7C7CB2E30F6E}"/>
+              </a:ext>
+              <a:ext uri="{C183D7F6-B498-43B3-948B-1728B52AA6E4}">
+                <adec:decorative xmlns:adec="http://schemas.microsoft.com/office/drawing/2017/decorative" val="1"/>
+              </a:ext>
+            </a:extLst>
+          </p:cNvPr>
+          <p:cNvSpPr>
+            <a:spLocks noGrp="1" noRot="1" noChangeAspect="1" noMove="1" noResize="1" noEditPoints="1" noAdjustHandles="1" noChangeArrowheads="1" noChangeShapeType="1" noTextEdit="1"/>
+          </p:cNvSpPr>
+          <p:nvPr>
+            <p:extLst>
+              <p:ext uri="{386F3935-93C4-4BCD-93E2-E3B085C9AB24}">
+                <p16:designElem xmlns:p16="http://schemas.microsoft.com/office/powerpoint/2015/main" val="1"/>
+              </p:ext>
+            </p:extLst>
+          </p:nvPr>
+        </p:nvSpPr>
+        <p:spPr>
+          <a:xfrm>
+            <a:off x="0" y="0"/>
+            <a:ext cx="4561583" cy="6858000"/>
+          </a:xfrm>
+          <a:prstGeom prst="rect">
+            <a:avLst/>
+          </a:prstGeom>
+          <a:ln>
+            <a:noFill/>
+          </a:ln>
+        </p:spPr>
+        <p:style>
+          <a:lnRef idx="2">
+            <a:schemeClr val="accent1">
+              <a:shade val="50000"/>
+            </a:schemeClr>
+          </a:lnRef>
+          <a:fillRef idx="1">
+            <a:schemeClr val="accent1"/>
+          </a:fillRef>
+          <a:effectRef idx="0">
+            <a:schemeClr val="accent1"/>
+          </a:effectRef>
+          <a:fontRef idx="minor">
+            <a:schemeClr val="lt1"/>
+          </a:fontRef>
+        </p:style>
+        <p:txBody>
+          <a:bodyPr rtlCol="0" anchor="ctr"/>
+          <a:lstStyle/>
+          <a:p>
+            <a:pPr algn="ctr"/>
+            <a:endParaRPr lang="en-US"/>
+          </a:p>
+        </p:txBody>
+      </p:sp>
+      <p:sp>
+        <p:nvSpPr>
+          <p:cNvPr id="10" name="Rectangle 9">
+            <a:extLst>
+              <a:ext uri="{FF2B5EF4-FFF2-40B4-BE49-F238E27FC236}">
+                <a16:creationId xmlns:a16="http://schemas.microsoft.com/office/drawing/2014/main" id="{B4F5FA0D-0104-4987-8241-EFF7C85B88DE}"/>
+              </a:ext>
+              <a:ext uri="{C183D7F6-B498-43B3-948B-1728B52AA6E4}">
+                <adec:decorative xmlns:adec="http://schemas.microsoft.com/office/drawing/2017/decorative" val="1"/>
+              </a:ext>
+            </a:extLst>
+          </p:cNvPr>
+          <p:cNvSpPr>
+            <a:spLocks noGrp="1" noRot="1" noChangeAspect="1" noMove="1" noResize="1" noEditPoints="1" noAdjustHandles="1" noChangeArrowheads="1" noChangeShapeType="1" noTextEdit="1"/>
+          </p:cNvSpPr>
+          <p:nvPr>
+            <p:extLst>
+              <p:ext uri="{386F3935-93C4-4BCD-93E2-E3B085C9AB24}">
+                <p16:designElem xmlns:p16="http://schemas.microsoft.com/office/powerpoint/2015/main" val="1"/>
+              </p:ext>
+            </p:extLst>
+          </p:nvPr>
+        </p:nvSpPr>
+        <p:spPr>
+          <a:xfrm>
+            <a:off x="0" y="0"/>
+            <a:ext cx="9143999" cy="6858000"/>
+          </a:xfrm>
+          <a:prstGeom prst="rect">
+            <a:avLst/>
+          </a:prstGeom>
+          <a:gradFill>
+            <a:gsLst>
+              <a:gs pos="0">
+                <a:schemeClr val="accent1">
+                  <a:lumMod val="90000"/>
+                </a:schemeClr>
+              </a:gs>
+              <a:gs pos="25000">
+                <a:schemeClr val="accent1">
+                  <a:lumMod val="90000"/>
+                </a:schemeClr>
+              </a:gs>
+              <a:gs pos="94000">
+                <a:schemeClr val="bg2">
+                  <a:lumMod val="25000"/>
+                </a:schemeClr>
+              </a:gs>
+              <a:gs pos="100000">
+                <a:schemeClr val="bg2">
+                  <a:lumMod val="25000"/>
+                </a:schemeClr>
+              </a:gs>
+            </a:gsLst>
+            <a:lin ang="4200000" scaled="0"/>
+          </a:gradFill>
+          <a:ln>
+            <a:noFill/>
+          </a:ln>
+        </p:spPr>
+        <p:style>
+          <a:lnRef idx="2">
+            <a:schemeClr val="accent1">
+              <a:shade val="50000"/>
+            </a:schemeClr>
+          </a:lnRef>
+          <a:fillRef idx="1">
+            <a:schemeClr val="accent1"/>
+          </a:fillRef>
+          <a:effectRef idx="0">
+            <a:schemeClr val="accent1"/>
+          </a:effectRef>
+          <a:fontRef idx="minor">
+            <a:schemeClr val="lt1"/>
+          </a:fontRef>
+        </p:style>
+        <p:txBody>
+          <a:bodyPr rtlCol="0" anchor="ctr"/>
+          <a:lstStyle/>
+          <a:p>
+            <a:pPr algn="ctr"/>
+            <a:endParaRPr lang="en-US"/>
+          </a:p>
+        </p:txBody>
+      </p:sp>
+      <p:pic>
+        <p:nvPicPr>
+          <p:cNvPr id="12" name="Picture 11">
+            <a:extLst>
+              <a:ext uri="{FF2B5EF4-FFF2-40B4-BE49-F238E27FC236}">
+                <a16:creationId xmlns:a16="http://schemas.microsoft.com/office/drawing/2014/main" id="{2897127E-6CEF-446C-BE87-93B7C46E49D1}"/>
+              </a:ext>
+              <a:ext uri="{C183D7F6-B498-43B3-948B-1728B52AA6E4}">
+                <adec:decorative xmlns:adec="http://schemas.microsoft.com/office/drawing/2017/decorative" val="1"/>
+              </a:ext>
+            </a:extLst>
+          </p:cNvPr>
+          <p:cNvPicPr>
+            <a:picLocks noGrp="1" noRot="1" noChangeAspect="1" noMove="1" noResize="1" noEditPoints="1" noAdjustHandles="1" noChangeArrowheads="1" noChangeShapeType="1" noCrop="1"/>
+          </p:cNvPicPr>
+          <p:nvPr>
+            <p:extLst>
+              <p:ext uri="{386F3935-93C4-4BCD-93E2-E3B085C9AB24}">
+                <p16:designElem xmlns:p16="http://schemas.microsoft.com/office/powerpoint/2015/main" val="1"/>
+              </p:ext>
+            </p:extLst>
+          </p:nvPr>
+        </p:nvPicPr>
+        <p:blipFill>
+          <a:blip r:embed="rId2">
+            <a:extLst>
+              <a:ext uri="{28A0092B-C50C-407E-A947-70E740481C1C}">
+                <a14:useLocalDpi xmlns:a14="http://schemas.microsoft.com/office/drawing/2010/main" val="0"/>
+              </a:ext>
+            </a:extLst>
+          </a:blip>
+          <a:stretch>
+            <a:fillRect/>
+          </a:stretch>
+        </p:blipFill>
+        <p:spPr>
+          <a:xfrm>
+            <a:off x="0" y="0"/>
+            <a:ext cx="9144000" cy="6858000"/>
+          </a:xfrm>
+          <a:prstGeom prst="rect">
+            <a:avLst/>
+          </a:prstGeom>
+        </p:spPr>
+      </p:pic>
+      <p:sp>
+        <p:nvSpPr>
+          <p:cNvPr id="2" name="Title 1">
+            <a:extLst>
+              <a:ext uri="{FF2B5EF4-FFF2-40B4-BE49-F238E27FC236}">
+                <a16:creationId xmlns:a16="http://schemas.microsoft.com/office/drawing/2014/main" id="{EF794C47-4DB9-4060-AF5B-C3F5DAF2CF16}"/>
+              </a:ext>
+            </a:extLst>
+          </p:cNvPr>
+          <p:cNvSpPr>
+            <a:spLocks noGrp="1"/>
+          </p:cNvSpPr>
+          <p:nvPr>
+            <p:ph type="title"/>
+          </p:nvPr>
+        </p:nvSpPr>
+        <p:spPr>
+          <a:xfrm>
+            <a:off x="480059" y="2053641"/>
+            <a:ext cx="2751871" cy="2760098"/>
+          </a:xfrm>
+        </p:spPr>
+        <p:txBody>
+          <a:bodyPr>
+            <a:normAutofit/>
+          </a:bodyPr>
+          <a:lstStyle/>
+          <a:p>
+            <a:r>
+              <a:rPr lang="en-US" dirty="0" err="1">
+                <a:solidFill>
+                  <a:srgbClr val="FFFFFF"/>
+                </a:solidFill>
+                <a:latin typeface="Helvetica" panose="020B0604020202020204" pitchFamily="34" charset="0"/>
+                <a:cs typeface="Helvetica" panose="020B0604020202020204" pitchFamily="34" charset="0"/>
+              </a:rPr>
+              <a:t>BigML</a:t>
+            </a:r>
+            <a:r>
+              <a:rPr lang="en-US" dirty="0">
+                <a:solidFill>
+                  <a:srgbClr val="FFFFFF"/>
+                </a:solidFill>
+                <a:latin typeface="Helvetica" panose="020B0604020202020204" pitchFamily="34" charset="0"/>
+                <a:cs typeface="Helvetica" panose="020B0604020202020204" pitchFamily="34" charset="0"/>
+              </a:rPr>
+              <a:t> DEMO</a:t>
+            </a:r>
+          </a:p>
+        </p:txBody>
+      </p:sp>
+      <p:sp>
+        <p:nvSpPr>
+          <p:cNvPr id="3" name="Content Placeholder 2">
+            <a:extLst>
+              <a:ext uri="{FF2B5EF4-FFF2-40B4-BE49-F238E27FC236}">
+                <a16:creationId xmlns:a16="http://schemas.microsoft.com/office/drawing/2014/main" id="{D179188A-1792-4E9E-B41E-6361998473D4}"/>
+              </a:ext>
+            </a:extLst>
+          </p:cNvPr>
+          <p:cNvSpPr>
+            <a:spLocks noGrp="1"/>
+          </p:cNvSpPr>
+          <p:nvPr>
+            <p:ph idx="1"/>
+          </p:nvPr>
+        </p:nvSpPr>
+        <p:spPr>
+          <a:xfrm>
+            <a:off x="4567930" y="801866"/>
+            <a:ext cx="3979563" cy="5230634"/>
+          </a:xfrm>
+        </p:spPr>
+        <p:txBody>
+          <a:bodyPr anchor="ctr">
+            <a:normAutofit/>
+          </a:bodyPr>
+          <a:lstStyle/>
+          <a:p>
+            <a:endParaRPr lang="en-US" dirty="0">
+              <a:solidFill>
+                <a:srgbClr val="000000"/>
+              </a:solidFill>
+              <a:latin typeface="Helvetica" panose="020B0604020202020204" pitchFamily="34" charset="0"/>
+              <a:cs typeface="Helvetica" panose="020B0604020202020204" pitchFamily="34" charset="0"/>
+            </a:endParaRPr>
+          </a:p>
+          <a:p>
+            <a:r>
+              <a:rPr lang="en-US" dirty="0">
+                <a:solidFill>
+                  <a:srgbClr val="000000"/>
+                </a:solidFill>
+                <a:latin typeface="Helvetica" panose="020B0604020202020204" pitchFamily="34" charset="0"/>
+                <a:cs typeface="Helvetica" panose="020B0604020202020204" pitchFamily="34" charset="0"/>
+              </a:rPr>
+              <a:t>Regression on Iowa Housing Price Data Set</a:t>
+            </a:r>
+          </a:p>
+          <a:p>
+            <a:pPr marL="0" indent="0">
+              <a:buNone/>
+            </a:pPr>
+            <a:r>
+              <a:rPr lang="en-US" dirty="0">
+                <a:solidFill>
+                  <a:srgbClr val="000000"/>
+                </a:solidFill>
+                <a:latin typeface="Helvetica" panose="020B0604020202020204" pitchFamily="34" charset="0"/>
+                <a:cs typeface="Helvetica" panose="020B0604020202020204" pitchFamily="34" charset="0"/>
+              </a:rPr>
+              <a:t>To predict the </a:t>
+            </a:r>
+            <a:r>
+              <a:rPr lang="en-US" dirty="0" err="1">
+                <a:solidFill>
+                  <a:srgbClr val="000000"/>
+                </a:solidFill>
+                <a:latin typeface="Helvetica" panose="020B0604020202020204" pitchFamily="34" charset="0"/>
+                <a:cs typeface="Helvetica" panose="020B0604020202020204" pitchFamily="34" charset="0"/>
+              </a:rPr>
+              <a:t>SalePrice</a:t>
+            </a:r>
+            <a:r>
+              <a:rPr lang="en-US" dirty="0">
+                <a:solidFill>
+                  <a:srgbClr val="000000"/>
+                </a:solidFill>
+                <a:latin typeface="Helvetica" panose="020B0604020202020204" pitchFamily="34" charset="0"/>
+                <a:cs typeface="Helvetica" panose="020B0604020202020204" pitchFamily="34" charset="0"/>
+              </a:rPr>
+              <a:t> of the house</a:t>
+            </a:r>
+          </a:p>
+          <a:p>
+            <a:pPr marL="0" indent="0">
+              <a:buNone/>
+            </a:pPr>
+            <a:endParaRPr lang="en-US" dirty="0">
+              <a:solidFill>
+                <a:srgbClr val="000000"/>
+              </a:solidFill>
+              <a:latin typeface="Helvetica" panose="020B0604020202020204" pitchFamily="34" charset="0"/>
+              <a:cs typeface="Helvetica" panose="020B0604020202020204" pitchFamily="34" charset="0"/>
+            </a:endParaRPr>
+          </a:p>
+          <a:p>
+            <a:r>
+              <a:rPr lang="en-US" dirty="0">
+                <a:solidFill>
+                  <a:srgbClr val="000000"/>
+                </a:solidFill>
+                <a:latin typeface="Helvetica" panose="020B0604020202020204" pitchFamily="34" charset="0"/>
+                <a:cs typeface="Helvetica" panose="020B0604020202020204" pitchFamily="34" charset="0"/>
+              </a:rPr>
+              <a:t>Classification on Titanic Data Set</a:t>
+            </a:r>
+          </a:p>
+          <a:p>
+            <a:pPr marL="0" indent="0">
+              <a:buNone/>
+            </a:pPr>
+            <a:r>
+              <a:rPr lang="en-US" dirty="0">
+                <a:solidFill>
+                  <a:srgbClr val="000000"/>
+                </a:solidFill>
+                <a:latin typeface="Helvetica" panose="020B0604020202020204" pitchFamily="34" charset="0"/>
+                <a:cs typeface="Helvetica" panose="020B0604020202020204" pitchFamily="34" charset="0"/>
+              </a:rPr>
+              <a:t>To predict the chance of Survival</a:t>
+            </a:r>
+          </a:p>
+        </p:txBody>
+      </p:sp>
+    </p:spTree>
+    <p:extLst>
+      <p:ext uri="{BB962C8B-B14F-4D97-AF65-F5344CB8AC3E}">
+        <p14:creationId xmlns:p14="http://schemas.microsoft.com/office/powerpoint/2010/main" val="3585388341"/>
       </p:ext>
     </p:extLst>
   </p:cSld>
@@ -12854,7 +13275,7 @@
           <a:graphicData uri="http://schemas.openxmlformats.org/presentationml/2006/ole">
             <mc:AlternateContent xmlns:mc="http://schemas.openxmlformats.org/markup-compatibility/2006">
               <mc:Choice xmlns:v="urn:schemas-microsoft-com:vml" Requires="v">
-                <p:oleObj spid="_x0000_s2059" name="Acrobat Document" showAsIcon="1" r:id="rId3" imgW="914400" imgH="771480" progId="AcroExch.Document.DC">
+                <p:oleObj spid="_x0000_s2063" name="Acrobat Document" showAsIcon="1" r:id="rId3" imgW="914400" imgH="771480" progId="AcroExch.Document.DC">
                   <p:embed/>
                 </p:oleObj>
               </mc:Choice>
@@ -12917,7 +13338,7 @@
           <a:graphicData uri="http://schemas.openxmlformats.org/presentationml/2006/ole">
             <mc:AlternateContent xmlns:mc="http://schemas.openxmlformats.org/markup-compatibility/2006">
               <mc:Choice xmlns:v="urn:schemas-microsoft-com:vml" Requires="v">
-                <p:oleObj spid="_x0000_s2060" name="Packager Shell Object" showAsIcon="1" r:id="rId5" imgW="914400" imgH="771480" progId="Package">
+                <p:oleObj spid="_x0000_s2064" name="Packager Shell Object" showAsIcon="1" r:id="rId5" imgW="914400" imgH="771480" progId="Package">
                   <p:embed/>
                 </p:oleObj>
               </mc:Choice>

</xml_diff>